<commit_message>
[bug] For bug 50447: rename default color scheme "Office" -> "New Office"
</commit_message>
<xml_diff>
--- a/new/bg-BG/new.pptx
+++ b/new/bg-BG/new.pptx
@@ -3000,9 +3000,9 @@
 </file>
 
 <file path=ppt/theme/theme1.xml><?xml version="1.0" encoding="utf-8"?>
-<a:theme xmlns:a="http://schemas.openxmlformats.org/drawingml/2006/main" name="Office тема">
+<a:theme xmlns:a="http://schemas.openxmlformats.org/drawingml/2006/main" name="Office Theme">
   <a:themeElements>
-    <a:clrScheme name="Оffice">
+    <a:clrScheme name="New Office">
       <a:dk1>
         <a:sysClr val="windowText" lastClr="000000"/>
       </a:dk1>
@@ -3016,7 +3016,7 @@
         <a:srgbClr val="E7E6E6"/>
       </a:lt2>
       <a:accent1>
-        <a:srgbClr val="4472C4"/>
+        <a:srgbClr val="5B9BD5"/>
       </a:accent1>
       <a:accent2>
         <a:srgbClr val="ED7D31"/>
@@ -3028,7 +3028,7 @@
         <a:srgbClr val="FFC000"/>
       </a:accent4>
       <a:accent5>
-        <a:srgbClr val="5B9BD5"/>
+        <a:srgbClr val="4472C4"/>
       </a:accent5>
       <a:accent6>
         <a:srgbClr val="70AD47"/>
@@ -3040,9 +3040,9 @@
         <a:srgbClr val="954F72"/>
       </a:folHlink>
     </a:clrScheme>
-    <a:fontScheme name="Оffice">
+    <a:fontScheme name="Office Theme">
       <a:majorFont>
-        <a:latin typeface="Calibri Light" panose="020F0302020204030204"/>
+        <a:latin typeface="Arial" panose="020F0302020204030204"/>
         <a:ea typeface=""/>
         <a:cs typeface=""/>
         <a:font script="Jpan" typeface="ＭＳ Ｐゴシック"/>
@@ -3077,7 +3077,7 @@
         <a:font script="Geor" typeface="Sylfaen"/>
       </a:majorFont>
       <a:minorFont>
-        <a:latin typeface="Calibri" panose="020F0502020204030204"/>
+        <a:latin typeface="Arial" panose="020F0502020204030204"/>
         <a:ea typeface=""/>
         <a:cs typeface=""/>
         <a:font script="Jpan" typeface="ＭＳ Ｐゴシック"/>
@@ -3112,7 +3112,7 @@
         <a:font script="Geor" typeface="Sylfaen"/>
       </a:minorFont>
     </a:fontScheme>
-    <a:fmtScheme name="Оffice">
+    <a:fmtScheme name="Office Theme">
       <a:fillStyleLst>
         <a:solidFill>
           <a:schemeClr val="phClr"/>

</xml_diff>